<commit_message>
Prepare examples for unioffice v1.13.0
</commit_message>
<xml_diff>
--- a/presentation/text_extraction/extract.pptx
+++ b/presentation/text_extraction/extract.pptx
@@ -7,6 +7,7 @@
   <p:sldIdLst>
     <p:sldId id="256" r:id="rId2"/>
     <p:sldId id="257" r:id="rId3"/>
+    <p:sldId id="258" r:id="rId4"/>
   </p:sldIdLst>
   <p:sldSz cx="12192000" cy="6858000"/>
   <p:notesSz cx="6858000" cy="9144000"/>
@@ -276,7 +277,7 @@
           <a:p>
             <a:fld id="{D4A213A3-10E9-421F-81BE-56E0786AB515}" type="datetime2">
               <a:rPr lang="en-US" smtClean="0"/>
-              <a:t>Friday, December 11, 2020</a:t>
+              <a:t>Thursday, July 22, 2021</a:t>
             </a:fld>
             <a:endParaRPr lang="en-US"/>
           </a:p>
@@ -474,7 +475,7 @@
           <a:p>
             <a:fld id="{3D5DABC0-2199-478F-BA77-33A651B6CB89}" type="datetime2">
               <a:rPr lang="en-US" smtClean="0"/>
-              <a:t>Friday, December 11, 2020</a:t>
+              <a:t>Thursday, July 22, 2021</a:t>
             </a:fld>
             <a:endParaRPr lang="en-US"/>
           </a:p>
@@ -683,7 +684,7 @@
           <a:p>
             <a:fld id="{D72230C6-DF61-47F4-B8C5-1B70E884BF06}" type="datetime2">
               <a:rPr lang="en-US" smtClean="0"/>
-              <a:t>Friday, December 11, 2020</a:t>
+              <a:t>Thursday, July 22, 2021</a:t>
             </a:fld>
             <a:endParaRPr lang="en-US"/>
           </a:p>
@@ -893,7 +894,7 @@
           <a:p>
             <a:fld id="{6B12B50C-7EEE-46CD-BAF7-BBC4026D959A}" type="datetime2">
               <a:rPr lang="en-US" smtClean="0"/>
-              <a:t>Friday, December 11, 2020</a:t>
+              <a:t>Thursday, July 22, 2021</a:t>
             </a:fld>
             <a:endParaRPr lang="en-US"/>
           </a:p>
@@ -1173,7 +1174,7 @@
           <a:p>
             <a:fld id="{8D4211C4-AE09-4254-A5E3-6DA9B099C971}" type="datetime2">
               <a:rPr lang="en-US" smtClean="0"/>
-              <a:t>Friday, December 11, 2020</a:t>
+              <a:t>Thursday, July 22, 2021</a:t>
             </a:fld>
             <a:endParaRPr lang="en-US"/>
           </a:p>
@@ -1452,7 +1453,7 @@
           <a:p>
             <a:fld id="{681742C3-E082-4760-93B2-E209268DD00C}" type="datetime2">
               <a:rPr lang="en-US" smtClean="0"/>
-              <a:t>Friday, December 11, 2020</a:t>
+              <a:t>Thursday, July 22, 2021</a:t>
             </a:fld>
             <a:endParaRPr lang="en-US"/>
           </a:p>
@@ -1873,7 +1874,7 @@
           <a:p>
             <a:fld id="{3B6FC950-F824-48B9-B984-CAEE265865E5}" type="datetime2">
               <a:rPr lang="en-US" smtClean="0"/>
-              <a:t>Friday, December 11, 2020</a:t>
+              <a:t>Thursday, July 22, 2021</a:t>
             </a:fld>
             <a:endParaRPr lang="en-US"/>
           </a:p>
@@ -2026,7 +2027,7 @@
           <a:p>
             <a:fld id="{BC8E3A0F-68E7-4D17-BB84-ED1BA4F6AC6B}" type="datetime2">
               <a:rPr lang="en-US" smtClean="0"/>
-              <a:t>Friday, December 11, 2020</a:t>
+              <a:t>Thursday, July 22, 2021</a:t>
             </a:fld>
             <a:endParaRPr lang="en-US"/>
           </a:p>
@@ -2139,7 +2140,7 @@
           <a:p>
             <a:fld id="{EDB7BC4F-EDA1-4BA2-BFF3-FE5B31CCB58B}" type="datetime2">
               <a:rPr lang="en-US" smtClean="0"/>
-              <a:t>Friday, December 11, 2020</a:t>
+              <a:t>Thursday, July 22, 2021</a:t>
             </a:fld>
             <a:endParaRPr lang="en-US"/>
           </a:p>
@@ -2453,7 +2454,7 @@
           <a:p>
             <a:fld id="{3AAE694C-1394-4838-A564-7380835C2E77}" type="datetime2">
               <a:rPr lang="en-US" smtClean="0"/>
-              <a:t>Friday, December 11, 2020</a:t>
+              <a:t>Thursday, July 22, 2021</a:t>
             </a:fld>
             <a:endParaRPr lang="en-US"/>
           </a:p>
@@ -2746,7 +2747,7 @@
           <a:p>
             <a:fld id="{CAB84B19-1A00-4EDB-8425-E1827A377364}" type="datetime2">
               <a:rPr lang="en-US" smtClean="0"/>
-              <a:t>Friday, December 11, 2020</a:t>
+              <a:t>Thursday, July 22, 2021</a:t>
             </a:fld>
             <a:endParaRPr lang="en-US"/>
           </a:p>
@@ -3115,7 +3116,7 @@
           <a:p>
             <a:fld id="{10076A27-8146-4F75-9851-A83577C6FD8A}" type="datetime2">
               <a:rPr lang="en-US" smtClean="0"/>
-              <a:t>Friday, December 11, 2020</a:t>
+              <a:t>Thursday, July 22, 2021</a:t>
             </a:fld>
             <a:endParaRPr lang="en-US"/>
           </a:p>
@@ -4570,6 +4571,275 @@
 </p:sld>
 </file>
 
+<file path=ppt/slides/slide3.xml><?xml version="1.0" encoding="utf-8"?>
+<p:sld xmlns:a="http://schemas.openxmlformats.org/drawingml/2006/main" xmlns:r="http://schemas.openxmlformats.org/officeDocument/2006/relationships" xmlns:p="http://schemas.openxmlformats.org/presentationml/2006/main">
+  <p:cSld>
+    <p:spTree>
+      <p:nvGrpSpPr>
+        <p:cNvPr id="1" name=""/>
+        <p:cNvGrpSpPr/>
+        <p:nvPr/>
+      </p:nvGrpSpPr>
+      <p:grpSpPr>
+        <a:xfrm>
+          <a:off x="0" y="0"/>
+          <a:ext cx="0" cy="0"/>
+          <a:chOff x="0" y="0"/>
+          <a:chExt cx="0" cy="0"/>
+        </a:xfrm>
+      </p:grpSpPr>
+      <p:sp>
+        <p:nvSpPr>
+          <p:cNvPr id="4" name="TextBox 3">
+            <a:extLst>
+              <a:ext uri="{FF2B5EF4-FFF2-40B4-BE49-F238E27FC236}">
+                <a16:creationId xmlns:a16="http://schemas.microsoft.com/office/drawing/2014/main" id="{9BFB8579-58EB-5845-8778-3ED26124911E}"/>
+              </a:ext>
+            </a:extLst>
+          </p:cNvPr>
+          <p:cNvSpPr txBox="1"/>
+          <p:nvPr/>
+        </p:nvSpPr>
+        <p:spPr>
+          <a:xfrm>
+            <a:off x="1028700" y="825500"/>
+            <a:ext cx="1930400" cy="3877985"/>
+          </a:xfrm>
+          <a:prstGeom prst="rect">
+            <a:avLst/>
+          </a:prstGeom>
+          <a:noFill/>
+        </p:spPr>
+        <p:txBody>
+          <a:bodyPr wrap="square" rtlCol="0">
+            <a:spAutoFit/>
+          </a:bodyPr>
+          <a:lstStyle/>
+          <a:p>
+            <a:r>
+              <a:rPr lang="en-RU" sz="2400" b="1" dirty="0"/>
+              <a:t>Header 1</a:t>
+            </a:r>
+          </a:p>
+          <a:p>
+            <a:endParaRPr lang="en-RU" sz="2400" b="1" dirty="0"/>
+          </a:p>
+          <a:p>
+            <a:r>
+              <a:rPr lang="en-RU" b="1" dirty="0"/>
+              <a:t>While text is sorted from the left to the right first and then from the top to the bottom, this text should go right after ‘Header 1’ because they share the same textbox</a:t>
+            </a:r>
+          </a:p>
+        </p:txBody>
+      </p:sp>
+      <p:sp>
+        <p:nvSpPr>
+          <p:cNvPr id="5" name="TextBox 4">
+            <a:extLst>
+              <a:ext uri="{FF2B5EF4-FFF2-40B4-BE49-F238E27FC236}">
+                <a16:creationId xmlns:a16="http://schemas.microsoft.com/office/drawing/2014/main" id="{68CEC1F4-C7CC-3547-A73D-1803181E2B03}"/>
+              </a:ext>
+            </a:extLst>
+          </p:cNvPr>
+          <p:cNvSpPr txBox="1"/>
+          <p:nvPr/>
+        </p:nvSpPr>
+        <p:spPr>
+          <a:xfrm>
+            <a:off x="3505200" y="736600"/>
+            <a:ext cx="1930400" cy="4985980"/>
+          </a:xfrm>
+          <a:prstGeom prst="rect">
+            <a:avLst/>
+          </a:prstGeom>
+          <a:noFill/>
+        </p:spPr>
+        <p:txBody>
+          <a:bodyPr wrap="square" rtlCol="0">
+            <a:spAutoFit/>
+          </a:bodyPr>
+          <a:lstStyle/>
+          <a:p>
+            <a:r>
+              <a:rPr lang="en-RU" sz="2400" b="1" dirty="0"/>
+              <a:t>Header 2</a:t>
+            </a:r>
+          </a:p>
+          <a:p>
+            <a:endParaRPr lang="en-RU" sz="2400" b="1" dirty="0"/>
+          </a:p>
+          <a:p>
+            <a:r>
+              <a:rPr lang="en-RU" b="1" dirty="0"/>
+              <a:t>While being located a bit above ‘Header 1’ textbox, this header and text should go after it as the difference between y-coordinates of textboxes is not </a:t>
+            </a:r>
+            <a:r>
+              <a:rPr lang="en-US" b="1" dirty="0"/>
+              <a:t>significant compared to the difference between x coordinates</a:t>
+            </a:r>
+            <a:endParaRPr lang="en-RU" b="1" dirty="0"/>
+          </a:p>
+        </p:txBody>
+      </p:sp>
+      <p:sp>
+        <p:nvSpPr>
+          <p:cNvPr id="6" name="TextBox 5">
+            <a:extLst>
+              <a:ext uri="{FF2B5EF4-FFF2-40B4-BE49-F238E27FC236}">
+                <a16:creationId xmlns:a16="http://schemas.microsoft.com/office/drawing/2014/main" id="{3F67E120-85D0-4A4D-94AF-ECC381E50BBC}"/>
+              </a:ext>
+            </a:extLst>
+          </p:cNvPr>
+          <p:cNvSpPr txBox="1"/>
+          <p:nvPr/>
+        </p:nvSpPr>
+        <p:spPr>
+          <a:xfrm>
+            <a:off x="5676900" y="685800"/>
+            <a:ext cx="1930400" cy="830997"/>
+          </a:xfrm>
+          <a:prstGeom prst="rect">
+            <a:avLst/>
+          </a:prstGeom>
+          <a:noFill/>
+        </p:spPr>
+        <p:txBody>
+          <a:bodyPr wrap="square" rtlCol="0">
+            <a:spAutoFit/>
+          </a:bodyPr>
+          <a:lstStyle/>
+          <a:p>
+            <a:r>
+              <a:rPr lang="en-RU" sz="2400" b="1" dirty="0"/>
+              <a:t>Header 3</a:t>
+            </a:r>
+          </a:p>
+          <a:p>
+            <a:endParaRPr lang="en-RU" sz="2400" b="1" dirty="0"/>
+          </a:p>
+        </p:txBody>
+      </p:sp>
+      <p:sp>
+        <p:nvSpPr>
+          <p:cNvPr id="7" name="TextBox 6">
+            <a:extLst>
+              <a:ext uri="{FF2B5EF4-FFF2-40B4-BE49-F238E27FC236}">
+                <a16:creationId xmlns:a16="http://schemas.microsoft.com/office/drawing/2014/main" id="{563CF042-15C5-DC41-8BA0-8772472E57EB}"/>
+              </a:ext>
+            </a:extLst>
+          </p:cNvPr>
+          <p:cNvSpPr txBox="1"/>
+          <p:nvPr/>
+        </p:nvSpPr>
+        <p:spPr>
+          <a:xfrm>
+            <a:off x="8547100" y="685800"/>
+            <a:ext cx="1930400" cy="830997"/>
+          </a:xfrm>
+          <a:prstGeom prst="rect">
+            <a:avLst/>
+          </a:prstGeom>
+          <a:noFill/>
+        </p:spPr>
+        <p:txBody>
+          <a:bodyPr wrap="square" rtlCol="0">
+            <a:spAutoFit/>
+          </a:bodyPr>
+          <a:lstStyle/>
+          <a:p>
+            <a:r>
+              <a:rPr lang="en-RU" sz="2400" b="1" dirty="0"/>
+              <a:t>Header 4</a:t>
+            </a:r>
+          </a:p>
+          <a:p>
+            <a:endParaRPr lang="en-RU" sz="2400" b="1" dirty="0"/>
+          </a:p>
+        </p:txBody>
+      </p:sp>
+      <p:sp>
+        <p:nvSpPr>
+          <p:cNvPr id="8" name="TextBox 7">
+            <a:extLst>
+              <a:ext uri="{FF2B5EF4-FFF2-40B4-BE49-F238E27FC236}">
+                <a16:creationId xmlns:a16="http://schemas.microsoft.com/office/drawing/2014/main" id="{F00DA98D-DF29-DE45-A702-B7EF60661BDA}"/>
+              </a:ext>
+            </a:extLst>
+          </p:cNvPr>
+          <p:cNvSpPr txBox="1"/>
+          <p:nvPr/>
+        </p:nvSpPr>
+        <p:spPr>
+          <a:xfrm>
+            <a:off x="5676900" y="1516797"/>
+            <a:ext cx="1930400" cy="2308324"/>
+          </a:xfrm>
+          <a:prstGeom prst="rect">
+            <a:avLst/>
+          </a:prstGeom>
+          <a:noFill/>
+        </p:spPr>
+        <p:txBody>
+          <a:bodyPr wrap="square" rtlCol="0">
+            <a:spAutoFit/>
+          </a:bodyPr>
+          <a:lstStyle/>
+          <a:p>
+            <a:r>
+              <a:rPr lang="en-RU" b="1" dirty="0"/>
+              <a:t>This text does not share the same textbox with ‘Header 3’ so it is treated as a separate element and will go only after ‘Header 4’</a:t>
+            </a:r>
+          </a:p>
+        </p:txBody>
+      </p:sp>
+      <p:sp>
+        <p:nvSpPr>
+          <p:cNvPr id="9" name="TextBox 8">
+            <a:extLst>
+              <a:ext uri="{FF2B5EF4-FFF2-40B4-BE49-F238E27FC236}">
+                <a16:creationId xmlns:a16="http://schemas.microsoft.com/office/drawing/2014/main" id="{BA20F7C0-B2DF-934C-A271-49A6B8F82F02}"/>
+              </a:ext>
+            </a:extLst>
+          </p:cNvPr>
+          <p:cNvSpPr txBox="1"/>
+          <p:nvPr/>
+        </p:nvSpPr>
+        <p:spPr>
+          <a:xfrm>
+            <a:off x="8407400" y="1516797"/>
+            <a:ext cx="1930400" cy="646331"/>
+          </a:xfrm>
+          <a:prstGeom prst="rect">
+            <a:avLst/>
+          </a:prstGeom>
+          <a:noFill/>
+        </p:spPr>
+        <p:txBody>
+          <a:bodyPr wrap="square" rtlCol="0">
+            <a:spAutoFit/>
+          </a:bodyPr>
+          <a:lstStyle/>
+          <a:p>
+            <a:r>
+              <a:rPr lang="en-RU" b="1" dirty="0"/>
+              <a:t>This text will go last anyway</a:t>
+            </a:r>
+          </a:p>
+        </p:txBody>
+      </p:sp>
+    </p:spTree>
+    <p:extLst>
+      <p:ext uri="{BB962C8B-B14F-4D97-AF65-F5344CB8AC3E}">
+        <p14:creationId xmlns:p14="http://schemas.microsoft.com/office/powerpoint/2010/main" val="2276897039"/>
+      </p:ext>
+    </p:extLst>
+  </p:cSld>
+  <p:clrMapOvr>
+    <a:masterClrMapping/>
+  </p:clrMapOvr>
+</p:sld>
+</file>
+
 <file path=ppt/theme/theme1.xml><?xml version="1.0" encoding="utf-8"?>
 <a:theme xmlns:a="http://schemas.openxmlformats.org/drawingml/2006/main" name="GradientRiseVTI">
   <a:themeElements>

</xml_diff>